<commit_message>
Project Charter - Typo fix Charter Presentation - Added more info to my slides
</commit_message>
<xml_diff>
--- a/Charter Presentation/Team Ink3d.pptx
+++ b/Charter Presentation/Team Ink3d.pptx
@@ -315,7 +315,7 @@
           <a:p>
             <a:fld id="{8FF4DA45-B795-4CB0-B3BB-6A487B8C4B48}" type="datetimeFigureOut">
               <a:rPr lang="en-US" smtClean="0"/>
-              <a:t>10/23/2013</a:t>
+              <a:t>10/22/13</a:t>
             </a:fld>
             <a:endParaRPr lang="en-US"/>
           </a:p>
@@ -480,7 +480,7 @@
           <a:p>
             <a:fld id="{8FF4DA45-B795-4CB0-B3BB-6A487B8C4B48}" type="datetimeFigureOut">
               <a:rPr lang="en-US" smtClean="0"/>
-              <a:t>10/23/2013</a:t>
+              <a:t>10/22/13</a:t>
             </a:fld>
             <a:endParaRPr lang="en-US"/>
           </a:p>
@@ -655,7 +655,7 @@
           <a:p>
             <a:fld id="{8FF4DA45-B795-4CB0-B3BB-6A487B8C4B48}" type="datetimeFigureOut">
               <a:rPr lang="en-US" smtClean="0"/>
-              <a:t>10/23/2013</a:t>
+              <a:t>10/22/13</a:t>
             </a:fld>
             <a:endParaRPr lang="en-US"/>
           </a:p>
@@ -820,7 +820,7 @@
           <a:p>
             <a:fld id="{8FF4DA45-B795-4CB0-B3BB-6A487B8C4B48}" type="datetimeFigureOut">
               <a:rPr lang="en-US" smtClean="0"/>
-              <a:t>10/23/2013</a:t>
+              <a:t>10/22/13</a:t>
             </a:fld>
             <a:endParaRPr lang="en-US"/>
           </a:p>
@@ -1061,7 +1061,7 @@
           <a:p>
             <a:fld id="{8FF4DA45-B795-4CB0-B3BB-6A487B8C4B48}" type="datetimeFigureOut">
               <a:rPr lang="en-US" smtClean="0"/>
-              <a:t>10/23/2013</a:t>
+              <a:t>10/22/13</a:t>
             </a:fld>
             <a:endParaRPr lang="en-US"/>
           </a:p>
@@ -1344,7 +1344,7 @@
           <a:p>
             <a:fld id="{8FF4DA45-B795-4CB0-B3BB-6A487B8C4B48}" type="datetimeFigureOut">
               <a:rPr lang="en-US" smtClean="0"/>
-              <a:t>10/23/2013</a:t>
+              <a:t>10/22/13</a:t>
             </a:fld>
             <a:endParaRPr lang="en-US"/>
           </a:p>
@@ -1773,7 +1773,7 @@
           <a:p>
             <a:fld id="{8FF4DA45-B795-4CB0-B3BB-6A487B8C4B48}" type="datetimeFigureOut">
               <a:rPr lang="en-US" smtClean="0"/>
-              <a:t>10/23/2013</a:t>
+              <a:t>10/22/13</a:t>
             </a:fld>
             <a:endParaRPr lang="en-US"/>
           </a:p>
@@ -1886,7 +1886,7 @@
           <a:p>
             <a:fld id="{8FF4DA45-B795-4CB0-B3BB-6A487B8C4B48}" type="datetimeFigureOut">
               <a:rPr lang="en-US" smtClean="0"/>
-              <a:t>10/23/2013</a:t>
+              <a:t>10/22/13</a:t>
             </a:fld>
             <a:endParaRPr lang="en-US"/>
           </a:p>
@@ -1976,7 +1976,7 @@
           <a:p>
             <a:fld id="{8FF4DA45-B795-4CB0-B3BB-6A487B8C4B48}" type="datetimeFigureOut">
               <a:rPr lang="en-US" smtClean="0"/>
-              <a:t>10/23/2013</a:t>
+              <a:t>10/22/13</a:t>
             </a:fld>
             <a:endParaRPr lang="en-US"/>
           </a:p>
@@ -2165,7 +2165,7 @@
           <a:p>
             <a:fld id="{8FF4DA45-B795-4CB0-B3BB-6A487B8C4B48}" type="datetimeFigureOut">
               <a:rPr lang="en-US" smtClean="0"/>
-              <a:t>10/23/2013</a:t>
+              <a:t>10/22/13</a:t>
             </a:fld>
             <a:endParaRPr lang="en-US"/>
           </a:p>
@@ -2483,7 +2483,7 @@
           <a:p>
             <a:fld id="{8FF4DA45-B795-4CB0-B3BB-6A487B8C4B48}" type="datetimeFigureOut">
               <a:rPr lang="en-US" smtClean="0"/>
-              <a:t>10/23/2013</a:t>
+              <a:t>10/22/13</a:t>
             </a:fld>
             <a:endParaRPr lang="en-US"/>
           </a:p>
@@ -2862,7 +2862,7 @@
           <a:p>
             <a:fld id="{8FF4DA45-B795-4CB0-B3BB-6A487B8C4B48}" type="datetimeFigureOut">
               <a:rPr lang="en-US" smtClean="0"/>
-              <a:t>10/23/2013</a:t>
+              <a:t>10/22/13</a:t>
             </a:fld>
             <a:endParaRPr lang="en-US"/>
           </a:p>
@@ -3288,7 +3288,7 @@
   <p:timing>
     <p:tnLst>
       <p:par>
-        <p:cTn id="1" dur="indefinite" restart="never" nodeType="tmRoot"/>
+        <p:cTn xmlns:p14="http://schemas.microsoft.com/office/powerpoint/2010/main" id="1" dur="indefinite" restart="never" nodeType="tmRoot"/>
       </p:par>
     </p:tnLst>
   </p:timing>
@@ -3768,8 +3768,58 @@
           <a:p>
             <a:r>
               <a:rPr lang="en-US" dirty="0" smtClean="0"/>
-              <a:t>Reported Project Manager each week through Individual Status Reports</a:t>
-            </a:r>
+              <a:t>Reported to Team Lead </a:t>
+            </a:r>
+            <a:r>
+              <a:rPr lang="en-US" dirty="0" smtClean="0"/>
+              <a:t>each week through Individual Status </a:t>
+            </a:r>
+            <a:r>
+              <a:rPr lang="en-US" dirty="0" smtClean="0"/>
+              <a:t>Reports</a:t>
+            </a:r>
+          </a:p>
+          <a:p>
+            <a:pPr lvl="1"/>
+            <a:r>
+              <a:rPr lang="en-US" dirty="0" smtClean="0"/>
+              <a:t>ACWP (Actual Cost)</a:t>
+            </a:r>
+          </a:p>
+          <a:p>
+            <a:pPr lvl="1"/>
+            <a:r>
+              <a:rPr lang="en-US" dirty="0" smtClean="0"/>
+              <a:t>Actual Start</a:t>
+            </a:r>
+          </a:p>
+          <a:p>
+            <a:pPr lvl="1"/>
+            <a:r>
+              <a:rPr lang="en-US" dirty="0" smtClean="0"/>
+              <a:t>Actual Finish</a:t>
+            </a:r>
+          </a:p>
+          <a:p>
+            <a:r>
+              <a:rPr lang="en-US" dirty="0" smtClean="0"/>
+              <a:t>Maintained in Project Plan</a:t>
+            </a:r>
+          </a:p>
+          <a:p>
+            <a:pPr lvl="1"/>
+            <a:r>
+              <a:rPr lang="en-US" dirty="0" smtClean="0"/>
+              <a:t>BCWS (Planned Value)</a:t>
+            </a:r>
+          </a:p>
+          <a:p>
+            <a:pPr lvl="1"/>
+            <a:r>
+              <a:rPr lang="en-US" dirty="0" smtClean="0"/>
+              <a:t>BCWP (Earned Value)</a:t>
+            </a:r>
+            <a:endParaRPr lang="en-US" dirty="0" smtClean="0"/>
           </a:p>
           <a:p>
             <a:r>
@@ -3873,27 +3923,58 @@
           <a:p>
             <a:r>
               <a:rPr lang="en-US" dirty="0" smtClean="0"/>
-              <a:t>Scope defined through SRS and WBS</a:t>
+              <a:t>Scope </a:t>
+            </a:r>
+            <a:r>
+              <a:rPr lang="en-US" dirty="0" smtClean="0"/>
+              <a:t>defined through SRS and WBS</a:t>
             </a:r>
             <a:endParaRPr lang="en-US" dirty="0"/>
           </a:p>
           <a:p>
             <a:r>
               <a:rPr lang="en-US" dirty="0" smtClean="0"/>
-              <a:t>Scope changes may be proposed by team members or the project sponsor</a:t>
+              <a:t>Controlled </a:t>
+            </a:r>
+            <a:r>
+              <a:rPr lang="en-US" dirty="0"/>
+              <a:t>through Team Member Accountability</a:t>
             </a:r>
           </a:p>
           <a:p>
             <a:r>
               <a:rPr lang="en-US" dirty="0" smtClean="0"/>
-              <a:t>Verified based on requirements in SRS</a:t>
-            </a:r>
-          </a:p>
-          <a:p>
+              <a:t>Deliverables verified </a:t>
+            </a:r>
             <a:r>
               <a:rPr lang="en-US" dirty="0" smtClean="0"/>
-              <a:t>Controlled through Team Member Accountability</a:t>
-            </a:r>
+              <a:t>based on </a:t>
+            </a:r>
+            <a:r>
+              <a:rPr lang="en-US" dirty="0" smtClean="0"/>
+              <a:t>SRS and WBS</a:t>
+            </a:r>
+          </a:p>
+          <a:p>
+            <a:pPr lvl="1"/>
+            <a:r>
+              <a:rPr lang="en-US" dirty="0" smtClean="0"/>
+              <a:t>Concerns will be discussed with team members and the project sponsor</a:t>
+            </a:r>
+            <a:endParaRPr lang="en-US" dirty="0" smtClean="0"/>
+          </a:p>
+          <a:p>
+            <a:r>
+              <a:rPr lang="en-US" dirty="0" smtClean="0"/>
+              <a:t>Scope </a:t>
+            </a:r>
+            <a:r>
+              <a:rPr lang="en-US" dirty="0"/>
+              <a:t>changes may be proposed by team members or the project sponsor</a:t>
+            </a:r>
+          </a:p>
+          <a:p>
+            <a:endParaRPr lang="en-US" dirty="0" smtClean="0"/>
           </a:p>
         </p:txBody>
       </p:sp>
@@ -3967,29 +4048,82 @@
           <a:p>
             <a:r>
               <a:rPr lang="en-US" dirty="0" smtClean="0"/>
+              <a:t>Many unknowns involved in our project</a:t>
+            </a:r>
+          </a:p>
+          <a:p>
+            <a:r>
+              <a:rPr lang="en-US" dirty="0" smtClean="0"/>
               <a:t>Process</a:t>
             </a:r>
+            <a:endParaRPr lang="en-US" dirty="0" smtClean="0"/>
           </a:p>
           <a:p>
             <a:pPr lvl="1"/>
             <a:r>
               <a:rPr lang="en-US" dirty="0" smtClean="0"/>
-              <a:t>Change Control Form</a:t>
+              <a:t>Potential Change Identified</a:t>
             </a:r>
           </a:p>
           <a:p>
             <a:pPr lvl="1"/>
             <a:r>
               <a:rPr lang="en-US" dirty="0" smtClean="0"/>
-              <a:t>Team/Sponsor Approval</a:t>
+              <a:t>Change </a:t>
+            </a:r>
+            <a:r>
+              <a:rPr lang="en-US" dirty="0" smtClean="0"/>
+              <a:t>Control </a:t>
+            </a:r>
+            <a:r>
+              <a:rPr lang="en-US" dirty="0" smtClean="0"/>
+              <a:t>Form presented to Team Lead</a:t>
+            </a:r>
+          </a:p>
+          <a:p>
+            <a:pPr lvl="1"/>
+            <a:r>
+              <a:rPr lang="en-US" dirty="0" smtClean="0"/>
+              <a:t>Team Lead presents the changes to the team</a:t>
+            </a:r>
+          </a:p>
+          <a:p>
+            <a:pPr lvl="1"/>
+            <a:r>
+              <a:rPr lang="en-US" dirty="0" smtClean="0"/>
+              <a:t>Team discusses changes</a:t>
+            </a:r>
+            <a:endParaRPr lang="en-US" dirty="0" smtClean="0"/>
+          </a:p>
+          <a:p>
+            <a:pPr lvl="1"/>
+            <a:r>
+              <a:rPr lang="en-US" dirty="0" smtClean="0"/>
+              <a:t>Team Approval</a:t>
+            </a:r>
+          </a:p>
+          <a:p>
+            <a:pPr lvl="1"/>
+            <a:r>
+              <a:rPr lang="en-US" dirty="0" smtClean="0"/>
+              <a:t>Sponsor Approval</a:t>
             </a:r>
             <a:endParaRPr lang="en-US" dirty="0"/>
           </a:p>
           <a:p>
             <a:r>
               <a:rPr lang="en-US" dirty="0" smtClean="0"/>
-              <a:t>Proposed changes will be documented and archived</a:t>
-            </a:r>
+              <a:t>All proposed </a:t>
+            </a:r>
+            <a:r>
+              <a:rPr lang="en-US" dirty="0" smtClean="0"/>
+              <a:t>changes will be documented </a:t>
+            </a:r>
+            <a:r>
+              <a:rPr lang="en-US" dirty="0" smtClean="0"/>
+              <a:t>using the Change Control Form</a:t>
+            </a:r>
+            <a:endParaRPr lang="en-US" dirty="0" smtClean="0"/>
           </a:p>
         </p:txBody>
       </p:sp>
@@ -4058,45 +4192,135 @@
         </p:nvSpPr>
         <p:spPr/>
         <p:txBody>
-          <a:bodyPr/>
+          <a:bodyPr>
+            <a:normAutofit fontScale="92500" lnSpcReduction="20000"/>
+          </a:bodyPr>
           <a:lstStyle/>
           <a:p>
             <a:r>
               <a:rPr lang="en-US" dirty="0" smtClean="0"/>
-              <a:t>Analysis of</a:t>
-            </a:r>
+              <a:t>Capture Analysis of:</a:t>
+            </a:r>
+            <a:endParaRPr lang="en-US" dirty="0" smtClean="0"/>
           </a:p>
           <a:p>
             <a:pPr lvl="1"/>
             <a:r>
               <a:rPr lang="en-US" dirty="0" smtClean="0"/>
-              <a:t>Project Objectives</a:t>
-            </a:r>
+              <a:t>Project </a:t>
+            </a:r>
+            <a:r>
+              <a:rPr lang="en-US" dirty="0" smtClean="0"/>
+              <a:t>Objectives</a:t>
+            </a:r>
+            <a:endParaRPr lang="en-US" dirty="0" smtClean="0"/>
           </a:p>
           <a:p>
             <a:pPr lvl="1"/>
             <a:r>
               <a:rPr lang="en-US" dirty="0" smtClean="0"/>
-              <a:t>Lessons Learned</a:t>
-            </a:r>
-          </a:p>
-          <a:p>
+              <a:t>Lessons </a:t>
+            </a:r>
             <a:r>
               <a:rPr lang="en-US" dirty="0" smtClean="0"/>
-              <a:t>Customer Acceptance</a:t>
+              <a:t>Learned</a:t>
             </a:r>
           </a:p>
           <a:p>
             <a:r>
               <a:rPr lang="en-US" dirty="0" smtClean="0"/>
-              <a:t>Project Performance Report</a:t>
-            </a:r>
-          </a:p>
-          <a:p>
+              <a:t>Post Implementation Review</a:t>
+            </a:r>
+          </a:p>
+          <a:p>
+            <a:pPr lvl="1"/>
             <a:r>
               <a:rPr lang="en-US" dirty="0" smtClean="0"/>
-              <a:t>Archive Records</a:t>
-            </a:r>
+              <a:t>Does the project meet specifications?</a:t>
+            </a:r>
+          </a:p>
+          <a:p>
+            <a:pPr lvl="1"/>
+            <a:r>
+              <a:rPr lang="en-US" dirty="0" smtClean="0"/>
+              <a:t>Was the scope realistic for the project?</a:t>
+            </a:r>
+            <a:endParaRPr lang="en-US" dirty="0" smtClean="0"/>
+          </a:p>
+          <a:p>
+            <a:r>
+              <a:rPr lang="en-US" dirty="0" smtClean="0"/>
+              <a:t>Customer </a:t>
+            </a:r>
+            <a:r>
+              <a:rPr lang="en-US" dirty="0" smtClean="0"/>
+              <a:t>Acceptance</a:t>
+            </a:r>
+          </a:p>
+          <a:p>
+            <a:pPr lvl="1"/>
+            <a:r>
+              <a:rPr lang="en-US" dirty="0" smtClean="0"/>
+              <a:t>Verify based on SRS</a:t>
+            </a:r>
+          </a:p>
+          <a:p>
+            <a:pPr lvl="1"/>
+            <a:r>
+              <a:rPr lang="en-US" dirty="0" smtClean="0"/>
+              <a:t>Discuss open issues</a:t>
+            </a:r>
+            <a:endParaRPr lang="en-US" dirty="0" smtClean="0"/>
+          </a:p>
+          <a:p>
+            <a:r>
+              <a:rPr lang="en-US" dirty="0" smtClean="0"/>
+              <a:t>Project Performance </a:t>
+            </a:r>
+            <a:r>
+              <a:rPr lang="en-US" dirty="0" smtClean="0"/>
+              <a:t>Report</a:t>
+            </a:r>
+          </a:p>
+          <a:p>
+            <a:pPr lvl="1"/>
+            <a:r>
+              <a:rPr lang="en-US" dirty="0" smtClean="0"/>
+              <a:t>Performance based on Earned Value Management</a:t>
+            </a:r>
+          </a:p>
+          <a:p>
+            <a:pPr lvl="1"/>
+            <a:r>
+              <a:rPr lang="en-US" dirty="0" smtClean="0"/>
+              <a:t>Quality, Risk, Scope Management Performance</a:t>
+            </a:r>
+            <a:endParaRPr lang="en-US" dirty="0" smtClean="0"/>
+          </a:p>
+          <a:p>
+            <a:r>
+              <a:rPr lang="en-US" dirty="0" smtClean="0"/>
+              <a:t>Archive </a:t>
+            </a:r>
+            <a:r>
+              <a:rPr lang="en-US" dirty="0" smtClean="0"/>
+              <a:t>Records</a:t>
+            </a:r>
+          </a:p>
+          <a:p>
+            <a:pPr lvl="1"/>
+            <a:r>
+              <a:rPr lang="en-US" dirty="0" smtClean="0"/>
+              <a:t>Project Artifacts</a:t>
+            </a:r>
+          </a:p>
+          <a:p>
+            <a:pPr lvl="1"/>
+            <a:r>
+              <a:rPr lang="en-US" dirty="0" smtClean="0"/>
+              <a:t>Financial Records</a:t>
+            </a:r>
+            <a:endParaRPr lang="en-US" dirty="0" smtClean="0"/>
           </a:p>
         </p:txBody>
       </p:sp>

</xml_diff>

<commit_message>
Changed "Team Lead" to "Project Manager" in my sections for consistency
</commit_message>
<xml_diff>
--- a/Charter Presentation/Team Ink3d.pptx
+++ b/Charter Presentation/Team Ink3d.pptx
@@ -3768,15 +3768,23 @@
           <a:p>
             <a:r>
               <a:rPr lang="en-US" dirty="0" smtClean="0"/>
-              <a:t>Reported to Team Lead </a:t>
+              <a:t>Reported to </a:t>
             </a:r>
             <a:r>
               <a:rPr lang="en-US" dirty="0" smtClean="0"/>
-              <a:t>each week through Individual Status </a:t>
+              <a:t>Project </a:t>
             </a:r>
             <a:r>
               <a:rPr lang="en-US" dirty="0" smtClean="0"/>
-              <a:t>Reports</a:t>
+              <a:t>Manager </a:t>
+            </a:r>
+            <a:r>
+              <a:rPr lang="en-US" dirty="0" smtClean="0"/>
+              <a:t>each </a:t>
+            </a:r>
+            <a:r>
+              <a:rPr lang="en-US" dirty="0" smtClean="0"/>
+              <a:t>week through Individual Status Reports</a:t>
             </a:r>
           </a:p>
           <a:p>
@@ -3819,7 +3827,6 @@
               <a:rPr lang="en-US" dirty="0" smtClean="0"/>
               <a:t>BCWP (Earned Value)</a:t>
             </a:r>
-            <a:endParaRPr lang="en-US" dirty="0" smtClean="0"/>
           </a:p>
           <a:p>
             <a:r>
@@ -3923,11 +3930,7 @@
           <a:p>
             <a:r>
               <a:rPr lang="en-US" dirty="0" smtClean="0"/>
-              <a:t>Scope </a:t>
-            </a:r>
-            <a:r>
-              <a:rPr lang="en-US" dirty="0" smtClean="0"/>
-              <a:t>defined through SRS and WBS</a:t>
+              <a:t>Scope defined through SRS and WBS</a:t>
             </a:r>
             <a:endParaRPr lang="en-US" dirty="0"/>
           </a:p>
@@ -3944,15 +3947,7 @@
           <a:p>
             <a:r>
               <a:rPr lang="en-US" dirty="0" smtClean="0"/>
-              <a:t>Deliverables verified </a:t>
-            </a:r>
-            <a:r>
-              <a:rPr lang="en-US" dirty="0" smtClean="0"/>
-              <a:t>based on </a:t>
-            </a:r>
-            <a:r>
-              <a:rPr lang="en-US" dirty="0" smtClean="0"/>
-              <a:t>SRS and WBS</a:t>
+              <a:t>Deliverables verified based on SRS and WBS</a:t>
             </a:r>
           </a:p>
           <a:p>
@@ -3961,7 +3956,6 @@
               <a:rPr lang="en-US" dirty="0" smtClean="0"/>
               <a:t>Concerns will be discussed with team members and the project sponsor</a:t>
             </a:r>
-            <a:endParaRPr lang="en-US" dirty="0" smtClean="0"/>
           </a:p>
           <a:p>
             <a:r>
@@ -4056,7 +4050,6 @@
               <a:rPr lang="en-US" dirty="0" smtClean="0"/>
               <a:t>Process</a:t>
             </a:r>
-            <a:endParaRPr lang="en-US" dirty="0" smtClean="0"/>
           </a:p>
           <a:p>
             <a:pPr lvl="1"/>
@@ -4069,22 +4062,23 @@
             <a:pPr lvl="1"/>
             <a:r>
               <a:rPr lang="en-US" dirty="0" smtClean="0"/>
-              <a:t>Change </a:t>
+              <a:t>Change Control Form presented to </a:t>
             </a:r>
             <a:r>
               <a:rPr lang="en-US" dirty="0" smtClean="0"/>
-              <a:t>Control </a:t>
-            </a:r>
+              <a:t>Project Manager</a:t>
+            </a:r>
+            <a:endParaRPr lang="en-US" dirty="0" smtClean="0"/>
+          </a:p>
+          <a:p>
+            <a:pPr lvl="1"/>
             <a:r>
               <a:rPr lang="en-US" dirty="0" smtClean="0"/>
-              <a:t>Form presented to Team Lead</a:t>
-            </a:r>
-          </a:p>
-          <a:p>
-            <a:pPr lvl="1"/>
+              <a:t>Project Manager presents </a:t>
+            </a:r>
             <a:r>
               <a:rPr lang="en-US" dirty="0" smtClean="0"/>
-              <a:t>Team Lead presents the changes to the team</a:t>
+              <a:t>the changes to the team</a:t>
             </a:r>
           </a:p>
           <a:p>
@@ -4093,7 +4087,6 @@
               <a:rPr lang="en-US" dirty="0" smtClean="0"/>
               <a:t>Team discusses changes</a:t>
             </a:r>
-            <a:endParaRPr lang="en-US" dirty="0" smtClean="0"/>
           </a:p>
           <a:p>
             <a:pPr lvl="1"/>
@@ -4113,17 +4106,8 @@
           <a:p>
             <a:r>
               <a:rPr lang="en-US" dirty="0" smtClean="0"/>
-              <a:t>All proposed </a:t>
-            </a:r>
-            <a:r>
-              <a:rPr lang="en-US" dirty="0" smtClean="0"/>
-              <a:t>changes will be documented </a:t>
-            </a:r>
-            <a:r>
-              <a:rPr lang="en-US" dirty="0" smtClean="0"/>
-              <a:t>using the Change Control Form</a:t>
-            </a:r>
-            <a:endParaRPr lang="en-US" dirty="0" smtClean="0"/>
+              <a:t>All proposed changes will be documented using the Change Control Form</a:t>
+            </a:r>
           </a:p>
         </p:txBody>
       </p:sp>
@@ -4201,29 +4185,19 @@
               <a:rPr lang="en-US" dirty="0" smtClean="0"/>
               <a:t>Capture Analysis of:</a:t>
             </a:r>
-            <a:endParaRPr lang="en-US" dirty="0" smtClean="0"/>
           </a:p>
           <a:p>
             <a:pPr lvl="1"/>
             <a:r>
               <a:rPr lang="en-US" dirty="0" smtClean="0"/>
-              <a:t>Project </a:t>
-            </a:r>
+              <a:t>Project Objectives</a:t>
+            </a:r>
+          </a:p>
+          <a:p>
+            <a:pPr lvl="1"/>
             <a:r>
               <a:rPr lang="en-US" dirty="0" smtClean="0"/>
-              <a:t>Objectives</a:t>
-            </a:r>
-            <a:endParaRPr lang="en-US" dirty="0" smtClean="0"/>
-          </a:p>
-          <a:p>
-            <a:pPr lvl="1"/>
-            <a:r>
-              <a:rPr lang="en-US" dirty="0" smtClean="0"/>
-              <a:t>Lessons </a:t>
-            </a:r>
-            <a:r>
-              <a:rPr lang="en-US" dirty="0" smtClean="0"/>
-              <a:t>Learned</a:t>
+              <a:t>Lessons Learned</a:t>
             </a:r>
           </a:p>
           <a:p>
@@ -4245,16 +4219,11 @@
               <a:rPr lang="en-US" dirty="0" smtClean="0"/>
               <a:t>Was the scope realistic for the project?</a:t>
             </a:r>
-            <a:endParaRPr lang="en-US" dirty="0" smtClean="0"/>
           </a:p>
           <a:p>
             <a:r>
               <a:rPr lang="en-US" dirty="0" smtClean="0"/>
-              <a:t>Customer </a:t>
-            </a:r>
-            <a:r>
-              <a:rPr lang="en-US" dirty="0" smtClean="0"/>
-              <a:t>Acceptance</a:t>
+              <a:t>Customer Acceptance</a:t>
             </a:r>
           </a:p>
           <a:p>
@@ -4270,16 +4239,11 @@
               <a:rPr lang="en-US" dirty="0" smtClean="0"/>
               <a:t>Discuss open issues</a:t>
             </a:r>
-            <a:endParaRPr lang="en-US" dirty="0" smtClean="0"/>
           </a:p>
           <a:p>
             <a:r>
               <a:rPr lang="en-US" dirty="0" smtClean="0"/>
-              <a:t>Project Performance </a:t>
-            </a:r>
-            <a:r>
-              <a:rPr lang="en-US" dirty="0" smtClean="0"/>
-              <a:t>Report</a:t>
+              <a:t>Project Performance Report</a:t>
             </a:r>
           </a:p>
           <a:p>
@@ -4295,16 +4259,11 @@
               <a:rPr lang="en-US" dirty="0" smtClean="0"/>
               <a:t>Quality, Risk, Scope Management Performance</a:t>
             </a:r>
-            <a:endParaRPr lang="en-US" dirty="0" smtClean="0"/>
           </a:p>
           <a:p>
             <a:r>
               <a:rPr lang="en-US" dirty="0" smtClean="0"/>
-              <a:t>Archive </a:t>
-            </a:r>
-            <a:r>
-              <a:rPr lang="en-US" dirty="0" smtClean="0"/>
-              <a:t>Records</a:t>
+              <a:t>Archive Records</a:t>
             </a:r>
           </a:p>
           <a:p>
@@ -4320,7 +4279,6 @@
               <a:rPr lang="en-US" dirty="0" smtClean="0"/>
               <a:t>Financial Records</a:t>
             </a:r>
-            <a:endParaRPr lang="en-US" dirty="0" smtClean="0"/>
           </a:p>
         </p:txBody>
       </p:sp>
@@ -21009,8 +20967,8 @@
               <a:t>Project Manager: Daniel </a:t>
             </a:r>
             <a:r>
-              <a:rPr lang="en-US" dirty="0" err="1" smtClean="0"/>
-              <a:t>Laine</a:t>
+              <a:rPr lang="en-US" dirty="0" smtClean="0"/>
+              <a:t>Lain</a:t>
             </a:r>
             <a:endParaRPr lang="en-US" dirty="0" smtClean="0"/>
           </a:p>

</xml_diff>

<commit_message>
* Hacked out intermediate machine references in Charter Pres. * Split up Risk slides in charter pres.
</commit_message>
<xml_diff>
--- a/Charter Presentation/Team Ink3d.pptx
+++ b/Charter Presentation/Team Ink3d.pptx
@@ -16,10 +16,11 @@
     <p:sldId id="262" r:id="rId10"/>
     <p:sldId id="263" r:id="rId11"/>
     <p:sldId id="264" r:id="rId12"/>
-    <p:sldId id="265" r:id="rId13"/>
-    <p:sldId id="266" r:id="rId14"/>
-    <p:sldId id="267" r:id="rId15"/>
-    <p:sldId id="268" r:id="rId16"/>
+    <p:sldId id="271" r:id="rId13"/>
+    <p:sldId id="265" r:id="rId14"/>
+    <p:sldId id="266" r:id="rId15"/>
+    <p:sldId id="267" r:id="rId16"/>
+    <p:sldId id="268" r:id="rId17"/>
   </p:sldIdLst>
   <p:sldSz cx="9144000" cy="6858000" type="screen4x3"/>
   <p:notesSz cx="6858000" cy="9144000"/>
@@ -118,6 +119,22 @@
       </a:defRPr>
     </a:lvl9pPr>
   </p:defaultTextStyle>
+  <p:extLst>
+    <p:ext uri="{EFAFB233-063F-42B5-8137-9DF3F51BA10A}">
+      <p15:sldGuideLst xmlns:p15="http://schemas.microsoft.com/office/powerpoint/2012/main">
+        <p15:guide id="1" orient="horz" pos="2160">
+          <p15:clr>
+            <a:srgbClr val="A4A3A4"/>
+          </p15:clr>
+        </p15:guide>
+        <p15:guide id="2" pos="2880">
+          <p15:clr>
+            <a:srgbClr val="A4A3A4"/>
+          </p15:clr>
+        </p15:guide>
+      </p15:sldGuideLst>
+    </p:ext>
+  </p:extLst>
 </p:presentation>
 </file>
 
@@ -315,7 +332,7 @@
           <a:p>
             <a:fld id="{8FF4DA45-B795-4CB0-B3BB-6A487B8C4B48}" type="datetimeFigureOut">
               <a:rPr lang="en-US" smtClean="0"/>
-              <a:t>10/22/2013</a:t>
+              <a:t>10/23/2013</a:t>
             </a:fld>
             <a:endParaRPr lang="en-US"/>
           </a:p>
@@ -480,7 +497,7 @@
           <a:p>
             <a:fld id="{8FF4DA45-B795-4CB0-B3BB-6A487B8C4B48}" type="datetimeFigureOut">
               <a:rPr lang="en-US" smtClean="0"/>
-              <a:t>10/22/2013</a:t>
+              <a:t>10/23/2013</a:t>
             </a:fld>
             <a:endParaRPr lang="en-US"/>
           </a:p>
@@ -655,7 +672,7 @@
           <a:p>
             <a:fld id="{8FF4DA45-B795-4CB0-B3BB-6A487B8C4B48}" type="datetimeFigureOut">
               <a:rPr lang="en-US" smtClean="0"/>
-              <a:t>10/22/2013</a:t>
+              <a:t>10/23/2013</a:t>
             </a:fld>
             <a:endParaRPr lang="en-US"/>
           </a:p>
@@ -820,7 +837,7 @@
           <a:p>
             <a:fld id="{8FF4DA45-B795-4CB0-B3BB-6A487B8C4B48}" type="datetimeFigureOut">
               <a:rPr lang="en-US" smtClean="0"/>
-              <a:t>10/22/2013</a:t>
+              <a:t>10/23/2013</a:t>
             </a:fld>
             <a:endParaRPr lang="en-US"/>
           </a:p>
@@ -1061,7 +1078,7 @@
           <a:p>
             <a:fld id="{8FF4DA45-B795-4CB0-B3BB-6A487B8C4B48}" type="datetimeFigureOut">
               <a:rPr lang="en-US" smtClean="0"/>
-              <a:t>10/22/2013</a:t>
+              <a:t>10/23/2013</a:t>
             </a:fld>
             <a:endParaRPr lang="en-US"/>
           </a:p>
@@ -1344,7 +1361,7 @@
           <a:p>
             <a:fld id="{8FF4DA45-B795-4CB0-B3BB-6A487B8C4B48}" type="datetimeFigureOut">
               <a:rPr lang="en-US" smtClean="0"/>
-              <a:t>10/22/2013</a:t>
+              <a:t>10/23/2013</a:t>
             </a:fld>
             <a:endParaRPr lang="en-US"/>
           </a:p>
@@ -1773,7 +1790,7 @@
           <a:p>
             <a:fld id="{8FF4DA45-B795-4CB0-B3BB-6A487B8C4B48}" type="datetimeFigureOut">
               <a:rPr lang="en-US" smtClean="0"/>
-              <a:t>10/22/2013</a:t>
+              <a:t>10/23/2013</a:t>
             </a:fld>
             <a:endParaRPr lang="en-US"/>
           </a:p>
@@ -1886,7 +1903,7 @@
           <a:p>
             <a:fld id="{8FF4DA45-B795-4CB0-B3BB-6A487B8C4B48}" type="datetimeFigureOut">
               <a:rPr lang="en-US" smtClean="0"/>
-              <a:t>10/22/2013</a:t>
+              <a:t>10/23/2013</a:t>
             </a:fld>
             <a:endParaRPr lang="en-US"/>
           </a:p>
@@ -1976,7 +1993,7 @@
           <a:p>
             <a:fld id="{8FF4DA45-B795-4CB0-B3BB-6A487B8C4B48}" type="datetimeFigureOut">
               <a:rPr lang="en-US" smtClean="0"/>
-              <a:t>10/22/2013</a:t>
+              <a:t>10/23/2013</a:t>
             </a:fld>
             <a:endParaRPr lang="en-US"/>
           </a:p>
@@ -2165,7 +2182,7 @@
           <a:p>
             <a:fld id="{8FF4DA45-B795-4CB0-B3BB-6A487B8C4B48}" type="datetimeFigureOut">
               <a:rPr lang="en-US" smtClean="0"/>
-              <a:t>10/22/2013</a:t>
+              <a:t>10/23/2013</a:t>
             </a:fld>
             <a:endParaRPr lang="en-US"/>
           </a:p>
@@ -2483,7 +2500,7 @@
           <a:p>
             <a:fld id="{8FF4DA45-B795-4CB0-B3BB-6A487B8C4B48}" type="datetimeFigureOut">
               <a:rPr lang="en-US" smtClean="0"/>
-              <a:t>10/22/2013</a:t>
+              <a:t>10/23/2013</a:t>
             </a:fld>
             <a:endParaRPr lang="en-US"/>
           </a:p>
@@ -2862,7 +2879,7 @@
           <a:p>
             <a:fld id="{8FF4DA45-B795-4CB0-B3BB-6A487B8C4B48}" type="datetimeFigureOut">
               <a:rPr lang="en-US" smtClean="0"/>
-              <a:t>10/22/2013</a:t>
+              <a:t>10/23/2013</a:t>
             </a:fld>
             <a:endParaRPr lang="en-US"/>
           </a:p>
@@ -3527,7 +3544,7 @@
         </p:spPr>
         <p:txBody>
           <a:bodyPr>
-            <a:normAutofit fontScale="77500" lnSpcReduction="20000"/>
+            <a:normAutofit/>
           </a:bodyPr>
           <a:lstStyle/>
           <a:p>
@@ -3606,74 +3623,6 @@
             <a:r>
               <a:rPr lang="en-US" dirty="0" smtClean="0"/>
               <a:t>Slic3r, excessive research time, hardware failures, only one person with extensive hardware experience between both teams.</a:t>
-            </a:r>
-          </a:p>
-          <a:p>
-            <a:r>
-              <a:rPr lang="en-US" dirty="0" smtClean="0"/>
-              <a:t>Risk Analysis and Severity</a:t>
-            </a:r>
-          </a:p>
-          <a:p>
-            <a:pPr lvl="1"/>
-            <a:r>
-              <a:rPr lang="en-US" dirty="0" smtClean="0"/>
-              <a:t>Risks probability identified and categorized in order of severity in terms of impact on the team</a:t>
-            </a:r>
-          </a:p>
-          <a:p>
-            <a:r>
-              <a:rPr lang="en-US" dirty="0" smtClean="0"/>
-              <a:t>Risk Response</a:t>
-            </a:r>
-          </a:p>
-          <a:p>
-            <a:pPr lvl="1"/>
-            <a:r>
-              <a:rPr lang="en-US" dirty="0" smtClean="0"/>
-              <a:t>Risk Manager works with team to develop plan of action when risks have been identified and presented</a:t>
-            </a:r>
-          </a:p>
-          <a:p>
-            <a:pPr lvl="1"/>
-            <a:r>
-              <a:rPr lang="en-US" dirty="0" smtClean="0"/>
-              <a:t>Risk Response is a continual process. Conducted during team meetings.</a:t>
-            </a:r>
-          </a:p>
-          <a:p>
-            <a:r>
-              <a:rPr lang="en-US" dirty="0" smtClean="0"/>
-              <a:t>Risk Documentation </a:t>
-            </a:r>
-          </a:p>
-          <a:p>
-            <a:pPr lvl="1"/>
-            <a:r>
-              <a:rPr lang="en-US" dirty="0" smtClean="0"/>
-              <a:t>Spreadsheet will provide a quick-look table of risks identified by team members.</a:t>
-            </a:r>
-          </a:p>
-          <a:p>
-            <a:pPr lvl="1"/>
-            <a:r>
-              <a:rPr lang="en-US" dirty="0" smtClean="0"/>
-              <a:t>Hosted on </a:t>
-            </a:r>
-            <a:r>
-              <a:rPr lang="en-US" dirty="0" err="1" smtClean="0"/>
-              <a:t>Git</a:t>
-            </a:r>
-            <a:r>
-              <a:rPr lang="en-US" dirty="0" smtClean="0"/>
-              <a:t> repository</a:t>
-            </a:r>
-          </a:p>
-          <a:p>
-            <a:pPr lvl="1"/>
-            <a:r>
-              <a:rPr lang="en-US" smtClean="0"/>
-              <a:t>All-access. </a:t>
             </a:r>
           </a:p>
           <a:p>
@@ -3745,7 +3694,7 @@
           <a:p>
             <a:r>
               <a:rPr lang="en-US" dirty="0" smtClean="0"/>
-              <a:t>Earned Value Management</a:t>
+              <a:t>Risk Management</a:t>
             </a:r>
             <a:endParaRPr lang="en-US" dirty="0"/>
           </a:p>
@@ -3767,75 +3716,71 @@
           <a:lstStyle/>
           <a:p>
             <a:r>
-              <a:rPr lang="en-US" dirty="0" smtClean="0"/>
-              <a:t>Reported to Project Manager each week through Individual Status Reports</a:t>
+              <a:rPr lang="en-US" dirty="0"/>
+              <a:t>Risk Analysis and Severity</a:t>
             </a:r>
           </a:p>
           <a:p>
             <a:pPr lvl="1"/>
             <a:r>
-              <a:rPr lang="en-US" dirty="0" smtClean="0"/>
-              <a:t>ACWP (Actual Cost)</a:t>
+              <a:rPr lang="en-US" dirty="0"/>
+              <a:t>Risks probability identified and categorized in order of severity in terms of impact on the team</a:t>
+            </a:r>
+          </a:p>
+          <a:p>
+            <a:r>
+              <a:rPr lang="en-US" dirty="0"/>
+              <a:t>Risk Response</a:t>
             </a:r>
           </a:p>
           <a:p>
             <a:pPr lvl="1"/>
             <a:r>
-              <a:rPr lang="en-US" dirty="0" smtClean="0"/>
-              <a:t>Actual Start</a:t>
+              <a:rPr lang="en-US" dirty="0"/>
+              <a:t>Risk Manager works with team to develop plan of action when risks have been identified and presented</a:t>
             </a:r>
           </a:p>
           <a:p>
             <a:pPr lvl="1"/>
             <a:r>
-              <a:rPr lang="en-US" dirty="0" smtClean="0"/>
-              <a:t>Actual Finish</a:t>
-            </a:r>
-          </a:p>
-          <a:p>
-            <a:r>
-              <a:rPr lang="en-US" dirty="0" smtClean="0"/>
-              <a:t>Maintained in Project Plan</a:t>
+              <a:rPr lang="en-US" dirty="0"/>
+              <a:t>Risk Response is a continual process. Conducted during team meetings.</a:t>
+            </a:r>
+          </a:p>
+          <a:p>
+            <a:r>
+              <a:rPr lang="en-US" dirty="0"/>
+              <a:t>Risk Documentation </a:t>
             </a:r>
           </a:p>
           <a:p>
             <a:pPr lvl="1"/>
             <a:r>
-              <a:rPr lang="en-US" dirty="0" smtClean="0"/>
-              <a:t>BCWS (Planned Value)</a:t>
+              <a:rPr lang="en-US" dirty="0"/>
+              <a:t>Spreadsheet will provide a quick-look table of risks identified by team members.</a:t>
             </a:r>
           </a:p>
           <a:p>
             <a:pPr lvl="1"/>
             <a:r>
-              <a:rPr lang="en-US" dirty="0" smtClean="0"/>
-              <a:t>BCWP (Earned Value)</a:t>
-            </a:r>
-          </a:p>
-          <a:p>
-            <a:r>
               <a:rPr lang="en-US" dirty="0"/>
-              <a:t>Reviewed to refine Project </a:t>
-            </a:r>
-            <a:r>
-              <a:rPr lang="en-US" dirty="0" smtClean="0"/>
-              <a:t>Plan</a:t>
+              <a:t>Hosted on </a:t>
+            </a:r>
+            <a:r>
+              <a:rPr lang="en-US" dirty="0" err="1"/>
+              <a:t>Git</a:t>
+            </a:r>
+            <a:r>
+              <a:rPr lang="en-US" dirty="0"/>
+              <a:t> repository</a:t>
             </a:r>
           </a:p>
           <a:p>
             <a:pPr lvl="1"/>
             <a:r>
-              <a:rPr lang="en-US" dirty="0" smtClean="0"/>
-              <a:t>CPI</a:t>
-            </a:r>
-          </a:p>
-          <a:p>
-            <a:pPr lvl="1"/>
-            <a:r>
-              <a:rPr lang="en-US" dirty="0" smtClean="0"/>
-              <a:t>SPI</a:t>
-            </a:r>
-            <a:endParaRPr lang="en-US" dirty="0"/>
+              <a:rPr lang="en-US" dirty="0"/>
+              <a:t>All-access. </a:t>
+            </a:r>
           </a:p>
           <a:p>
             <a:endParaRPr lang="en-US" dirty="0"/>
@@ -3845,7 +3790,7 @@
     </p:spTree>
     <p:extLst>
       <p:ext uri="{BB962C8B-B14F-4D97-AF65-F5344CB8AC3E}">
-        <p14:creationId xmlns:p14="http://schemas.microsoft.com/office/powerpoint/2010/main" val="2101565688"/>
+        <p14:creationId xmlns:p14="http://schemas.microsoft.com/office/powerpoint/2010/main" val="1198897998"/>
       </p:ext>
     </p:extLst>
   </p:cSld>
@@ -3889,7 +3834,7 @@
           <a:p>
             <a:r>
               <a:rPr lang="en-US" dirty="0" smtClean="0"/>
-              <a:t>Scope Management Plan</a:t>
+              <a:t>Earned Value Management</a:t>
             </a:r>
             <a:endParaRPr lang="en-US" dirty="0"/>
           </a:p>
@@ -3907,59 +3852,89 @@
         </p:nvSpPr>
         <p:spPr/>
         <p:txBody>
-          <a:bodyPr>
-            <a:normAutofit/>
-          </a:bodyPr>
+          <a:bodyPr/>
           <a:lstStyle/>
           <a:p>
             <a:r>
               <a:rPr lang="en-US" dirty="0" smtClean="0"/>
-              <a:t>Scope defined through SRS and WBS</a:t>
+              <a:t>Reported to Project Manager each week through Individual Status Reports</a:t>
+            </a:r>
+          </a:p>
+          <a:p>
+            <a:pPr lvl="1"/>
+            <a:r>
+              <a:rPr lang="en-US" dirty="0" smtClean="0"/>
+              <a:t>ACWP (Actual Cost)</a:t>
+            </a:r>
+          </a:p>
+          <a:p>
+            <a:pPr lvl="1"/>
+            <a:r>
+              <a:rPr lang="en-US" dirty="0" smtClean="0"/>
+              <a:t>Actual Start</a:t>
+            </a:r>
+          </a:p>
+          <a:p>
+            <a:pPr lvl="1"/>
+            <a:r>
+              <a:rPr lang="en-US" dirty="0" smtClean="0"/>
+              <a:t>Actual Finish</a:t>
+            </a:r>
+          </a:p>
+          <a:p>
+            <a:r>
+              <a:rPr lang="en-US" dirty="0" smtClean="0"/>
+              <a:t>Maintained in Project Plan</a:t>
+            </a:r>
+          </a:p>
+          <a:p>
+            <a:pPr lvl="1"/>
+            <a:r>
+              <a:rPr lang="en-US" dirty="0" smtClean="0"/>
+              <a:t>BCWS (Planned Value)</a:t>
+            </a:r>
+          </a:p>
+          <a:p>
+            <a:pPr lvl="1"/>
+            <a:r>
+              <a:rPr lang="en-US" dirty="0" smtClean="0"/>
+              <a:t>BCWP (Earned Value)</a:t>
+            </a:r>
+          </a:p>
+          <a:p>
+            <a:r>
+              <a:rPr lang="en-US" dirty="0"/>
+              <a:t>Reviewed to refine Project </a:t>
+            </a:r>
+            <a:r>
+              <a:rPr lang="en-US" dirty="0" smtClean="0"/>
+              <a:t>Plan</a:t>
+            </a:r>
+          </a:p>
+          <a:p>
+            <a:pPr lvl="1"/>
+            <a:r>
+              <a:rPr lang="en-US" dirty="0" smtClean="0"/>
+              <a:t>CPI</a:t>
+            </a:r>
+          </a:p>
+          <a:p>
+            <a:pPr lvl="1"/>
+            <a:r>
+              <a:rPr lang="en-US" dirty="0" smtClean="0"/>
+              <a:t>SPI</a:t>
             </a:r>
             <a:endParaRPr lang="en-US" dirty="0"/>
           </a:p>
           <a:p>
-            <a:r>
-              <a:rPr lang="en-US" dirty="0" smtClean="0"/>
-              <a:t>Controlled </a:t>
-            </a:r>
-            <a:r>
-              <a:rPr lang="en-US" dirty="0"/>
-              <a:t>through Team Member Accountability</a:t>
-            </a:r>
-          </a:p>
-          <a:p>
-            <a:r>
-              <a:rPr lang="en-US" dirty="0" smtClean="0"/>
-              <a:t>Deliverables verified based on SRS and WBS</a:t>
-            </a:r>
-          </a:p>
-          <a:p>
-            <a:pPr lvl="1"/>
-            <a:r>
-              <a:rPr lang="en-US" dirty="0" smtClean="0"/>
-              <a:t>Concerns will be discussed with team members and the project sponsor</a:t>
-            </a:r>
-          </a:p>
-          <a:p>
-            <a:r>
-              <a:rPr lang="en-US" dirty="0" smtClean="0"/>
-              <a:t>Scope </a:t>
-            </a:r>
-            <a:r>
-              <a:rPr lang="en-US" dirty="0"/>
-              <a:t>changes may be proposed by team members or the project sponsor</a:t>
-            </a:r>
-          </a:p>
-          <a:p>
-            <a:endParaRPr lang="en-US" dirty="0" smtClean="0"/>
+            <a:endParaRPr lang="en-US" dirty="0"/>
           </a:p>
         </p:txBody>
       </p:sp>
     </p:spTree>
     <p:extLst>
       <p:ext uri="{BB962C8B-B14F-4D97-AF65-F5344CB8AC3E}">
-        <p14:creationId xmlns:p14="http://schemas.microsoft.com/office/powerpoint/2010/main" val="2887788218"/>
+        <p14:creationId xmlns:p14="http://schemas.microsoft.com/office/powerpoint/2010/main" val="2101565688"/>
       </p:ext>
     </p:extLst>
   </p:cSld>
@@ -4003,6 +3978,120 @@
           <a:p>
             <a:r>
               <a:rPr lang="en-US" dirty="0" smtClean="0"/>
+              <a:t>Scope Management Plan</a:t>
+            </a:r>
+            <a:endParaRPr lang="en-US" dirty="0"/>
+          </a:p>
+        </p:txBody>
+      </p:sp>
+      <p:sp>
+        <p:nvSpPr>
+          <p:cNvPr id="3" name="Content Placeholder 2"/>
+          <p:cNvSpPr>
+            <a:spLocks noGrp="1"/>
+          </p:cNvSpPr>
+          <p:nvPr>
+            <p:ph idx="1"/>
+          </p:nvPr>
+        </p:nvSpPr>
+        <p:spPr/>
+        <p:txBody>
+          <a:bodyPr>
+            <a:normAutofit/>
+          </a:bodyPr>
+          <a:lstStyle/>
+          <a:p>
+            <a:r>
+              <a:rPr lang="en-US" dirty="0" smtClean="0"/>
+              <a:t>Scope defined through SRS and WBS</a:t>
+            </a:r>
+            <a:endParaRPr lang="en-US" dirty="0"/>
+          </a:p>
+          <a:p>
+            <a:r>
+              <a:rPr lang="en-US" dirty="0" smtClean="0"/>
+              <a:t>Controlled </a:t>
+            </a:r>
+            <a:r>
+              <a:rPr lang="en-US" dirty="0"/>
+              <a:t>through Team Member Accountability</a:t>
+            </a:r>
+          </a:p>
+          <a:p>
+            <a:r>
+              <a:rPr lang="en-US" dirty="0" smtClean="0"/>
+              <a:t>Deliverables verified based on SRS and WBS</a:t>
+            </a:r>
+          </a:p>
+          <a:p>
+            <a:pPr lvl="1"/>
+            <a:r>
+              <a:rPr lang="en-US" dirty="0" smtClean="0"/>
+              <a:t>Concerns will be discussed with team members and the project sponsor</a:t>
+            </a:r>
+          </a:p>
+          <a:p>
+            <a:r>
+              <a:rPr lang="en-US" dirty="0" smtClean="0"/>
+              <a:t>Scope </a:t>
+            </a:r>
+            <a:r>
+              <a:rPr lang="en-US" dirty="0"/>
+              <a:t>changes may be proposed by team members or the project sponsor</a:t>
+            </a:r>
+          </a:p>
+          <a:p>
+            <a:endParaRPr lang="en-US" dirty="0" smtClean="0"/>
+          </a:p>
+        </p:txBody>
+      </p:sp>
+    </p:spTree>
+    <p:extLst>
+      <p:ext uri="{BB962C8B-B14F-4D97-AF65-F5344CB8AC3E}">
+        <p14:creationId xmlns:p14="http://schemas.microsoft.com/office/powerpoint/2010/main" val="2887788218"/>
+      </p:ext>
+    </p:extLst>
+  </p:cSld>
+  <p:clrMapOvr>
+    <a:masterClrMapping/>
+  </p:clrMapOvr>
+</p:sld>
+</file>
+
+<file path=ppt/slides/slide15.xml><?xml version="1.0" encoding="utf-8"?>
+<p:sld xmlns:a="http://schemas.openxmlformats.org/drawingml/2006/main" xmlns:r="http://schemas.openxmlformats.org/officeDocument/2006/relationships" xmlns:p="http://schemas.openxmlformats.org/presentationml/2006/main">
+  <p:cSld>
+    <p:spTree>
+      <p:nvGrpSpPr>
+        <p:cNvPr id="1" name=""/>
+        <p:cNvGrpSpPr/>
+        <p:nvPr/>
+      </p:nvGrpSpPr>
+      <p:grpSpPr>
+        <a:xfrm>
+          <a:off x="0" y="0"/>
+          <a:ext cx="0" cy="0"/>
+          <a:chOff x="0" y="0"/>
+          <a:chExt cx="0" cy="0"/>
+        </a:xfrm>
+      </p:grpSpPr>
+      <p:sp>
+        <p:nvSpPr>
+          <p:cNvPr id="2" name="Title 1"/>
+          <p:cNvSpPr>
+            <a:spLocks noGrp="1"/>
+          </p:cNvSpPr>
+          <p:nvPr>
+            <p:ph type="title"/>
+          </p:nvPr>
+        </p:nvSpPr>
+        <p:spPr/>
+        <p:txBody>
+          <a:bodyPr/>
+          <a:lstStyle/>
+          <a:p>
+            <a:r>
+              <a:rPr lang="en-US" dirty="0" smtClean="0"/>
               <a:t>Change Management</a:t>
             </a:r>
             <a:endParaRPr lang="en-US" dirty="0"/>
@@ -4099,7 +4188,7 @@
 </p:sld>
 </file>
 
-<file path=ppt/slides/slide15.xml><?xml version="1.0" encoding="utf-8"?>
+<file path=ppt/slides/slide16.xml><?xml version="1.0" encoding="utf-8"?>
 <p:sld xmlns:a="http://schemas.openxmlformats.org/drawingml/2006/main" xmlns:r="http://schemas.openxmlformats.org/officeDocument/2006/relationships" xmlns:p="http://schemas.openxmlformats.org/presentationml/2006/main">
   <p:cSld>
     <p:spTree>
@@ -4339,11 +4428,7 @@
           <a:p>
             <a:r>
               <a:rPr lang="en-US" dirty="0" smtClean="0"/>
-              <a:t>Oversight </a:t>
-            </a:r>
-            <a:r>
-              <a:rPr lang="en-US" dirty="0" smtClean="0"/>
-              <a:t>– Dr. </a:t>
+              <a:t>Oversight – Dr. </a:t>
             </a:r>
             <a:r>
               <a:rPr lang="en-US" dirty="0" err="1" smtClean="0"/>
@@ -23134,7 +23219,15 @@
             </a:pPr>
             <a:r>
               <a:rPr lang="en-US" dirty="0" smtClean="0"/>
-              <a:t>Host machine and operator</a:t>
+              <a:t>Host </a:t>
+            </a:r>
+            <a:r>
+              <a:rPr lang="en-US" dirty="0" smtClean="0"/>
+              <a:t>machine, software,  </a:t>
+            </a:r>
+            <a:r>
+              <a:rPr lang="en-US" dirty="0" smtClean="0"/>
+              <a:t>and operator</a:t>
             </a:r>
           </a:p>
           <a:p>
@@ -23144,17 +23237,11 @@
             </a:pPr>
             <a:r>
               <a:rPr lang="en-US" dirty="0" smtClean="0"/>
-              <a:t>Intermediate compact machine issues instructions to printer controller</a:t>
-            </a:r>
-          </a:p>
-          <a:p>
-            <a:pPr marL="800100" lvl="1" indent="-342900" algn="l">
-              <a:buFont typeface="Arial" panose="020B0604020202020204" pitchFamily="34" charset="0"/>
-              <a:buChar char="•"/>
-            </a:pPr>
+              <a:t>Printer </a:t>
+            </a:r>
             <a:r>
               <a:rPr lang="en-US" dirty="0" smtClean="0"/>
-              <a:t>Printer controller</a:t>
+              <a:t>controller</a:t>
             </a:r>
             <a:endParaRPr lang="en-US" dirty="0"/>
           </a:p>

</xml_diff>